<commit_message>
Tweaks to class materials for session 03.
</commit_message>
<xml_diff>
--- a/slides/session03.pptx
+++ b/slides/session03.pptx
@@ -3717,27 +3717,7 @@
                 <a:latin typeface="Gill Sans"/>
                 <a:cs typeface="Gill Sans"/>
               </a:rPr>
-              <a:t>: </a:t>
-            </a:r>
-            <a:r>
-              <a:rPr lang="en-US" sz="3600" dirty="0" smtClean="0">
-                <a:solidFill>
-                  <a:schemeClr val="bg1"/>
-                </a:solidFill>
-                <a:latin typeface="Gill Sans"/>
-                <a:cs typeface="Gill Sans"/>
-              </a:rPr>
-              <a:t>JavaScript - Structured </a:t>
-            </a:r>
-            <a:r>
-              <a:rPr lang="en-US" sz="3600" dirty="0" smtClean="0">
-                <a:solidFill>
-                  <a:schemeClr val="bg1"/>
-                </a:solidFill>
-                <a:latin typeface="Gill Sans"/>
-                <a:cs typeface="Gill Sans"/>
-              </a:rPr>
-              <a:t>Programming</a:t>
+              <a:t>: JavaScript - Structured Programming</a:t>
             </a:r>
             <a:endParaRPr lang="en-US" sz="2400" b="0" dirty="0">
               <a:solidFill>
@@ -5935,12 +5915,22 @@
             <a:r>
               <a:rPr lang="en-US" sz="2400" b="0" dirty="0">
                 <a:solidFill>
-                  <a:srgbClr val="000000"/>
-                </a:solidFill>
-                <a:latin typeface="Gill Sans"/>
-                <a:cs typeface="Gill Sans"/>
-              </a:rPr>
-              <a:t>if (gender == </a:t>
+                  <a:srgbClr val="FF0000"/>
+                </a:solidFill>
+                <a:latin typeface="Gill Sans"/>
+                <a:cs typeface="Gill Sans"/>
+              </a:rPr>
+              <a:t>if (</a:t>
+            </a:r>
+            <a:r>
+              <a:rPr lang="en-US" sz="2400" b="0" dirty="0">
+                <a:solidFill>
+                  <a:srgbClr val="000000"/>
+                </a:solidFill>
+                <a:latin typeface="Gill Sans"/>
+                <a:cs typeface="Gill Sans"/>
+              </a:rPr>
+              <a:t>gender == </a:t>
             </a:r>
             <a:r>
               <a:rPr lang="en-US" sz="2400" b="0" dirty="0" smtClean="0">
@@ -5965,7 +5955,7 @@
             <a:r>
               <a:rPr lang="en-US" sz="2400" b="0" dirty="0" smtClean="0">
                 <a:solidFill>
-                  <a:srgbClr val="000000"/>
+                  <a:srgbClr val="FF0000"/>
                 </a:solidFill>
                 <a:latin typeface="Gill Sans"/>
                 <a:cs typeface="Gill Sans"/>
@@ -5975,7 +5965,7 @@
             <a:r>
               <a:rPr lang="en-US" sz="2400" b="0" dirty="0">
                 <a:solidFill>
-                  <a:srgbClr val="000000"/>
+                  <a:srgbClr val="FF0000"/>
                 </a:solidFill>
                 <a:latin typeface="Gill Sans"/>
                 <a:cs typeface="Gill Sans"/>
@@ -6016,7 +6006,7 @@
             <a:r>
               <a:rPr lang="en-US" sz="2400" b="0" dirty="0">
                 <a:solidFill>
-                  <a:srgbClr val="000000"/>
+                  <a:srgbClr val="FF0000"/>
                 </a:solidFill>
                 <a:latin typeface="Gill Sans"/>
                 <a:cs typeface="Gill Sans"/>
@@ -6057,7 +6047,7 @@
             <a:r>
               <a:rPr lang="en-US" sz="2400" b="0" dirty="0">
                 <a:solidFill>
-                  <a:srgbClr val="000000"/>
+                  <a:srgbClr val="FF0000"/>
                 </a:solidFill>
                 <a:latin typeface="Gill Sans"/>
                 <a:cs typeface="Gill Sans"/>
@@ -6792,6 +6782,58 @@
           </a:p>
         </p:txBody>
       </p:sp>
+      <p:sp>
+        <p:nvSpPr>
+          <p:cNvPr id="15" name="TextBox 14"/>
+          <p:cNvSpPr txBox="1"/>
+          <p:nvPr/>
+        </p:nvSpPr>
+        <p:spPr>
+          <a:xfrm>
+            <a:off x="4572000" y="4495800"/>
+            <a:ext cx="3276600" cy="646331"/>
+          </a:xfrm>
+          <a:prstGeom prst="rect">
+            <a:avLst/>
+          </a:prstGeom>
+          <a:noFill/>
+        </p:spPr>
+        <p:txBody>
+          <a:bodyPr wrap="square" rtlCol="0">
+            <a:spAutoFit/>
+          </a:bodyPr>
+          <a:lstStyle/>
+          <a:p>
+            <a:r>
+              <a:rPr lang="en-US" sz="1800" b="0" dirty="0" smtClean="0">
+                <a:solidFill>
+                  <a:srgbClr val="FF0000"/>
+                </a:solidFill>
+                <a:latin typeface="Gill Sans"/>
+                <a:cs typeface="Gill Sans"/>
+              </a:rPr>
+              <a:t>Note, the text in red is part of the “template” of the </a:t>
+            </a:r>
+            <a:r>
+              <a:rPr lang="en-US" sz="1800" b="0" dirty="0" smtClean="0">
+                <a:solidFill>
+                  <a:srgbClr val="FF0000"/>
+                </a:solidFill>
+                <a:latin typeface="Gill Sans"/>
+                <a:cs typeface="Gill Sans"/>
+              </a:rPr>
+              <a:t>conditional</a:t>
+            </a:r>
+            <a:endParaRPr lang="en-US" sz="1800" b="0" dirty="0">
+              <a:solidFill>
+                <a:srgbClr val="FF0000"/>
+              </a:solidFill>
+              <a:latin typeface="Gill Sans"/>
+              <a:cs typeface="Gill Sans"/>
+            </a:endParaRPr>
+          </a:p>
+        </p:txBody>
+      </p:sp>
     </p:spTree>
     <p:extLst>
       <p:ext uri="{BB962C8B-B14F-4D97-AF65-F5344CB8AC3E}">
@@ -8698,7 +8740,7 @@
         </p:nvSpPr>
         <p:spPr bwMode="auto">
           <a:xfrm>
-            <a:off x="5029200" y="1548348"/>
+            <a:off x="5029200" y="1295400"/>
             <a:ext cx="3910746" cy="3785652"/>
           </a:xfrm>
           <a:prstGeom prst="rect">
@@ -8885,7 +8927,7 @@
             <a:r>
               <a:rPr lang="pt-BR" sz="2400" b="0" dirty="0" err="1">
                 <a:solidFill>
-                  <a:srgbClr val="000000"/>
+                  <a:srgbClr val="FF0000"/>
                 </a:solidFill>
                 <a:latin typeface="Gill Sans"/>
                 <a:cs typeface="Gill Sans"/>
@@ -8895,7 +8937,7 @@
             <a:r>
               <a:rPr lang="pt-BR" sz="2400" b="0" dirty="0">
                 <a:solidFill>
-                  <a:srgbClr val="000000"/>
+                  <a:srgbClr val="FF0000"/>
                 </a:solidFill>
                 <a:latin typeface="Gill Sans"/>
                 <a:cs typeface="Gill Sans"/>
@@ -8920,13 +8962,23 @@
                 <a:latin typeface="Gill Sans"/>
                 <a:cs typeface="Gill Sans"/>
               </a:rPr>
-              <a:t> &lt;= 10) {</a:t>
-            </a:r>
-          </a:p>
-          <a:p>
+              <a:t> &lt;= 10</a:t>
+            </a:r>
             <a:r>
               <a:rPr lang="pt-BR" sz="2400" b="0" dirty="0">
                 <a:solidFill>
+                  <a:srgbClr val="FF0000"/>
+                </a:solidFill>
+                <a:latin typeface="Gill Sans"/>
+                <a:cs typeface="Gill Sans"/>
+              </a:rPr>
+              <a:t>) {</a:t>
+            </a:r>
+          </a:p>
+          <a:p>
+            <a:r>
+              <a:rPr lang="pt-BR" sz="2400" b="0" dirty="0">
+                <a:solidFill>
                   <a:srgbClr val="000000"/>
                 </a:solidFill>
                 <a:latin typeface="Gill Sans"/>
@@ -9011,7 +9063,7 @@
             <a:r>
               <a:rPr lang="pt-BR" sz="2400" b="0" dirty="0">
                 <a:solidFill>
-                  <a:srgbClr val="000000"/>
+                  <a:srgbClr val="FF0000"/>
                 </a:solidFill>
                 <a:latin typeface="Gill Sans"/>
                 <a:cs typeface="Gill Sans"/>
@@ -9032,7 +9084,7 @@
             <a:r>
               <a:rPr lang="pt-BR" sz="2400" b="0" dirty="0">
                 <a:solidFill>
-                  <a:srgbClr val="000000"/>
+                  <a:srgbClr val="FF0000"/>
                 </a:solidFill>
                 <a:latin typeface="Gill Sans"/>
                 <a:cs typeface="Gill Sans"/>
@@ -9042,12 +9094,22 @@
             <a:r>
               <a:rPr lang="pt-BR" sz="2400" b="0" dirty="0" smtClean="0">
                 <a:solidFill>
-                  <a:srgbClr val="000000"/>
-                </a:solidFill>
-                <a:latin typeface="Gill Sans"/>
-                <a:cs typeface="Gill Sans"/>
-              </a:rPr>
-              <a:t>(var </a:t>
+                  <a:srgbClr val="FF0000"/>
+                </a:solidFill>
+                <a:latin typeface="Gill Sans"/>
+                <a:cs typeface="Gill Sans"/>
+              </a:rPr>
+              <a:t>(</a:t>
+            </a:r>
+            <a:r>
+              <a:rPr lang="pt-BR" sz="2400" b="0" dirty="0" smtClean="0">
+                <a:solidFill>
+                  <a:srgbClr val="000000"/>
+                </a:solidFill>
+                <a:latin typeface="Gill Sans"/>
+                <a:cs typeface="Gill Sans"/>
+              </a:rPr>
+              <a:t>var </a:t>
             </a:r>
             <a:r>
               <a:rPr lang="pt-BR" sz="2400" b="0" dirty="0" err="1" smtClean="0">
@@ -9077,7 +9139,27 @@
                 <a:latin typeface="Gill Sans"/>
                 <a:cs typeface="Gill Sans"/>
               </a:rPr>
-              <a:t>= 1; </a:t>
+              <a:t>= 1</a:t>
+            </a:r>
+            <a:r>
+              <a:rPr lang="pt-BR" sz="2400" b="0" dirty="0">
+                <a:solidFill>
+                  <a:srgbClr val="FF0000"/>
+                </a:solidFill>
+                <a:latin typeface="Gill Sans"/>
+                <a:cs typeface="Gill Sans"/>
+              </a:rPr>
+              <a:t>;</a:t>
+            </a:r>
+            <a:r>
+              <a:rPr lang="pt-BR" sz="2400" b="0" dirty="0">
+                <a:solidFill>
+                  <a:srgbClr val="000000"/>
+                </a:solidFill>
+                <a:latin typeface="Gill Sans"/>
+                <a:cs typeface="Gill Sans"/>
+              </a:rPr>
+              <a:t> </a:t>
             </a:r>
             <a:r>
               <a:rPr lang="pt-BR" sz="2400" b="0" dirty="0" err="1">
@@ -9097,7 +9179,27 @@
                 <a:latin typeface="Gill Sans"/>
                 <a:cs typeface="Gill Sans"/>
               </a:rPr>
-              <a:t> &lt;= 10; </a:t>
+              <a:t> &lt;= 10</a:t>
+            </a:r>
+            <a:r>
+              <a:rPr lang="pt-BR" sz="2400" b="0" dirty="0">
+                <a:solidFill>
+                  <a:srgbClr val="FF0000"/>
+                </a:solidFill>
+                <a:latin typeface="Gill Sans"/>
+                <a:cs typeface="Gill Sans"/>
+              </a:rPr>
+              <a:t>;</a:t>
+            </a:r>
+            <a:r>
+              <a:rPr lang="pt-BR" sz="2400" b="0" dirty="0">
+                <a:solidFill>
+                  <a:srgbClr val="000000"/>
+                </a:solidFill>
+                <a:latin typeface="Gill Sans"/>
+                <a:cs typeface="Gill Sans"/>
+              </a:rPr>
+              <a:t> </a:t>
             </a:r>
             <a:r>
               <a:rPr lang="pt-BR" sz="2400" b="0" dirty="0" err="1">
@@ -9117,13 +9219,23 @@
                 <a:latin typeface="Gill Sans"/>
                 <a:cs typeface="Gill Sans"/>
               </a:rPr>
-              <a:t>++) {</a:t>
-            </a:r>
-          </a:p>
-          <a:p>
+              <a:t>++</a:t>
+            </a:r>
             <a:r>
               <a:rPr lang="pt-BR" sz="2400" b="0" dirty="0">
                 <a:solidFill>
+                  <a:srgbClr val="FF0000"/>
+                </a:solidFill>
+                <a:latin typeface="Gill Sans"/>
+                <a:cs typeface="Gill Sans"/>
+              </a:rPr>
+              <a:t>) {</a:t>
+            </a:r>
+          </a:p>
+          <a:p>
+            <a:r>
+              <a:rPr lang="pt-BR" sz="2400" b="0" dirty="0">
+                <a:solidFill>
                   <a:srgbClr val="000000"/>
                 </a:solidFill>
                 <a:latin typeface="Gill Sans"/>
@@ -9176,12 +9288,22 @@
             <a:r>
               <a:rPr lang="pt-BR" sz="2400" b="0" dirty="0">
                 <a:solidFill>
-                  <a:srgbClr val="000000"/>
-                </a:solidFill>
-                <a:latin typeface="Gill Sans"/>
-                <a:cs typeface="Gill Sans"/>
-              </a:rPr>
-              <a:t>}	</a:t>
+                  <a:srgbClr val="FF0000"/>
+                </a:solidFill>
+                <a:latin typeface="Gill Sans"/>
+                <a:cs typeface="Gill Sans"/>
+              </a:rPr>
+              <a:t>}</a:t>
+            </a:r>
+            <a:r>
+              <a:rPr lang="pt-BR" sz="2400" b="0" dirty="0">
+                <a:solidFill>
+                  <a:srgbClr val="000000"/>
+                </a:solidFill>
+                <a:latin typeface="Gill Sans"/>
+                <a:cs typeface="Gill Sans"/>
+              </a:rPr>
+              <a:t>	</a:t>
             </a:r>
           </a:p>
           <a:p>
@@ -9819,6 +9941,58 @@
             <a:endParaRPr lang="en-US" sz="2400" b="0" dirty="0">
               <a:solidFill>
                 <a:srgbClr val="000000"/>
+              </a:solidFill>
+              <a:latin typeface="Gill Sans"/>
+              <a:cs typeface="Gill Sans"/>
+            </a:endParaRPr>
+          </a:p>
+        </p:txBody>
+      </p:sp>
+      <p:sp>
+        <p:nvSpPr>
+          <p:cNvPr id="13" name="TextBox 12"/>
+          <p:cNvSpPr txBox="1"/>
+          <p:nvPr/>
+        </p:nvSpPr>
+        <p:spPr>
+          <a:xfrm>
+            <a:off x="5105400" y="4876800"/>
+            <a:ext cx="3276600" cy="646331"/>
+          </a:xfrm>
+          <a:prstGeom prst="rect">
+            <a:avLst/>
+          </a:prstGeom>
+          <a:noFill/>
+        </p:spPr>
+        <p:txBody>
+          <a:bodyPr wrap="square" rtlCol="0">
+            <a:spAutoFit/>
+          </a:bodyPr>
+          <a:lstStyle/>
+          <a:p>
+            <a:r>
+              <a:rPr lang="en-US" sz="1800" b="0" dirty="0" smtClean="0">
+                <a:solidFill>
+                  <a:srgbClr val="FF0000"/>
+                </a:solidFill>
+                <a:latin typeface="Gill Sans"/>
+                <a:cs typeface="Gill Sans"/>
+              </a:rPr>
+              <a:t>Note, the text in red is part of the “template” of the </a:t>
+            </a:r>
+            <a:r>
+              <a:rPr lang="en-US" sz="1800" b="0" dirty="0" smtClean="0">
+                <a:solidFill>
+                  <a:srgbClr val="FF0000"/>
+                </a:solidFill>
+                <a:latin typeface="Gill Sans"/>
+                <a:cs typeface="Gill Sans"/>
+              </a:rPr>
+              <a:t>loop</a:t>
+            </a:r>
+            <a:endParaRPr lang="en-US" sz="1800" b="0" dirty="0">
+              <a:solidFill>
+                <a:srgbClr val="FF0000"/>
               </a:solidFill>
               <a:latin typeface="Gill Sans"/>
               <a:cs typeface="Gill Sans"/>

</xml_diff>

<commit_message>
Fixed typo in session 3 slides.
</commit_message>
<xml_diff>
--- a/slides/session03.pptx
+++ b/slides/session03.pptx
@@ -3655,25 +3655,8 @@
                 <a:latin typeface="Gill Sans"/>
                 <a:cs typeface="Gill Sans"/>
               </a:rPr>
-              <a:t>Thursday, September </a:t>
-            </a:r>
-            <a:r>
-              <a:rPr lang="en-US" sz="2400" b="0" kern="0" dirty="0" smtClean="0">
-                <a:solidFill>
-                  <a:schemeClr val="bg1"/>
-                </a:solidFill>
-                <a:latin typeface="Gill Sans"/>
-                <a:cs typeface="Gill Sans"/>
-              </a:rPr>
-              <a:t>19, 2013</a:t>
-            </a:r>
-            <a:endParaRPr lang="en-US" sz="2400" b="0" kern="0" dirty="0" smtClean="0">
-              <a:solidFill>
-                <a:schemeClr val="bg1"/>
-              </a:solidFill>
-              <a:latin typeface="Gill Sans"/>
-              <a:cs typeface="Gill Sans"/>
-            </a:endParaRPr>
+              <a:t>Thursday, September 19, 2013</a:t>
+            </a:r>
           </a:p>
         </p:txBody>
       </p:sp>
@@ -10118,7 +10101,11 @@
             </a:r>
             <a:r>
               <a:rPr lang="en-US" dirty="0"/>
-              <a:t>number between 0 and 3: </a:t>
+              <a:t>number between 0 and </a:t>
+            </a:r>
+            <a:r>
+              <a:rPr lang="en-US" dirty="0" smtClean="0"/>
+              <a:t>2: </a:t>
             </a:r>
             <a:r>
               <a:rPr lang="en-US" dirty="0" err="1"/>

</xml_diff>

<commit_message>
Fixed typo in dates.
</commit_message>
<xml_diff>
--- a/slides/session03.pptx
+++ b/slides/session03.pptx
@@ -3655,18 +3655,35 @@
                 <a:latin typeface="Gill Sans"/>
                 <a:cs typeface="Gill Sans"/>
               </a:rPr>
-              <a:t>Wednesday, February 12, </a:t>
-            </a:r>
-            <a:r>
-              <a:rPr lang="en-US" sz="2400" b="0" kern="0" dirty="0" smtClean="0">
+              <a:t>Wednesday, February 12</a:t>
+            </a:r>
+            <a:r>
+              <a:rPr lang="en-US" sz="2400" b="0" kern="0" smtClean="0">
                 <a:solidFill>
                   <a:schemeClr val="bg1"/>
                 </a:solidFill>
                 <a:latin typeface="Gill Sans"/>
                 <a:cs typeface="Gill Sans"/>
               </a:rPr>
-              <a:t>2013</a:t>
-            </a:r>
+              <a:t>, </a:t>
+            </a:r>
+            <a:r>
+              <a:rPr lang="en-US" sz="2400" b="0" kern="0" smtClean="0">
+                <a:solidFill>
+                  <a:schemeClr val="bg1"/>
+                </a:solidFill>
+                <a:latin typeface="Gill Sans"/>
+                <a:cs typeface="Gill Sans"/>
+              </a:rPr>
+              <a:t>2014</a:t>
+            </a:r>
+            <a:endParaRPr lang="en-US" sz="2400" b="0" kern="0" dirty="0" smtClean="0">
+              <a:solidFill>
+                <a:schemeClr val="bg1"/>
+              </a:solidFill>
+              <a:latin typeface="Gill Sans"/>
+              <a:cs typeface="Gill Sans"/>
+            </a:endParaRPr>
           </a:p>
         </p:txBody>
       </p:sp>

</xml_diff>